<commit_message>
Update Training a Multilayer Perceptron with Stochastic Gradient Descent.pptx
</commit_message>
<xml_diff>
--- a/Presentations/11_03_2020/Training a Multilayer Perceptron with Stochastic Gradient Descent.pptx
+++ b/Presentations/11_03_2020/Training a Multilayer Perceptron with Stochastic Gradient Descent.pptx
@@ -10216,8 +10216,8 @@
           </a:p>
         </p:txBody>
       </p:sp>
-      <mc:AlternateContent xmlns:mc="http://schemas.openxmlformats.org/markup-compatibility/2006">
-        <mc:Choice xmlns:a14="http://schemas.microsoft.com/office/drawing/2010/main" Requires="a14">
+      <mc:AlternateContent xmlns:mc="http://schemas.openxmlformats.org/markup-compatibility/2006" xmlns:a14="http://schemas.microsoft.com/office/drawing/2010/main">
+        <mc:Choice Requires="a14">
           <p:sp>
             <p:nvSpPr>
               <p:cNvPr id="3" name="Content Placeholder 2">
@@ -10408,7 +10408,7 @@
             </p:txBody>
           </p:sp>
         </mc:Choice>
-        <mc:Fallback>
+        <mc:Fallback xmlns="">
           <p:sp>
             <p:nvSpPr>
               <p:cNvPr id="3" name="Content Placeholder 2">
@@ -12460,7 +12460,7 @@
           <a:p>
             <a:r>
               <a:rPr lang="en-US" dirty="0"/>
-              <a:t>The Cost function is the function of the MLP output and the target vector </a:t>
+              <a:t>The Cost function is based on the MLP output and the target vector </a:t>
             </a:r>
           </a:p>
           <a:p>
@@ -12988,8 +12988,8 @@
           </a:p>
         </p:txBody>
       </p:sp>
-      <mc:AlternateContent xmlns:mc="http://schemas.openxmlformats.org/markup-compatibility/2006">
-        <mc:Choice xmlns:a14="http://schemas.microsoft.com/office/drawing/2010/main" Requires="a14">
+      <mc:AlternateContent xmlns:mc="http://schemas.openxmlformats.org/markup-compatibility/2006" xmlns:a14="http://schemas.microsoft.com/office/drawing/2010/main">
+        <mc:Choice Requires="a14">
           <p:sp>
             <p:nvSpPr>
               <p:cNvPr id="3" name="Content Placeholder 2">
@@ -13159,7 +13159,7 @@
             </p:txBody>
           </p:sp>
         </mc:Choice>
-        <mc:Fallback>
+        <mc:Fallback xmlns="">
           <p:sp>
             <p:nvSpPr>
               <p:cNvPr id="3" name="Content Placeholder 2">
@@ -13551,10 +13551,13 @@
                         </m:accPr>
                         <m:e>
                           <m:r>
-                            <a:rPr lang="en-US" sz="2400" b="0" i="1" smtClean="0">
+                            <m:rPr>
+                              <m:sty m:val="p"/>
+                            </m:rPr>
+                            <a:rPr lang="en-US" sz="2400" b="0" i="0" smtClean="0">
                               <a:latin typeface="Cambria Math" panose="02040503050406030204" pitchFamily="18" charset="0"/>
                             </a:rPr>
-                            <m:t>𝛿</m:t>
+                            <m:t>Δ</m:t>
                           </m:r>
                         </m:e>
                       </m:acc>
@@ -13755,8 +13758,8 @@
           </a:p>
         </p:txBody>
       </p:sp>
-      <mc:AlternateContent xmlns:mc="http://schemas.openxmlformats.org/markup-compatibility/2006">
-        <mc:Choice xmlns:a14="http://schemas.microsoft.com/office/drawing/2010/main" Requires="a14">
+      <mc:AlternateContent xmlns:mc="http://schemas.openxmlformats.org/markup-compatibility/2006" xmlns:a14="http://schemas.microsoft.com/office/drawing/2010/main">
+        <mc:Choice Requires="a14">
           <p:sp>
             <p:nvSpPr>
               <p:cNvPr id="3" name="Content Placeholder 2">
@@ -14195,7 +14198,7 @@
             </p:txBody>
           </p:sp>
         </mc:Choice>
-        <mc:Fallback>
+        <mc:Fallback xmlns="">
           <p:sp>
             <p:nvSpPr>
               <p:cNvPr id="3" name="Content Placeholder 2">
@@ -17765,8 +17768,8 @@
           </a:p>
         </p:txBody>
       </p:sp>
-      <mc:AlternateContent xmlns:mc="http://schemas.openxmlformats.org/markup-compatibility/2006">
-        <mc:Choice xmlns:a14="http://schemas.microsoft.com/office/drawing/2010/main" Requires="a14">
+      <mc:AlternateContent xmlns:mc="http://schemas.openxmlformats.org/markup-compatibility/2006" xmlns:a14="http://schemas.microsoft.com/office/drawing/2010/main">
+        <mc:Choice Requires="a14">
           <p:sp>
             <p:nvSpPr>
               <p:cNvPr id="3" name="Content Placeholder 2">
@@ -18021,7 +18024,7 @@
             </p:txBody>
           </p:sp>
         </mc:Choice>
-        <mc:Fallback>
+        <mc:Fallback xmlns="">
           <p:sp>
             <p:nvSpPr>
               <p:cNvPr id="3" name="Content Placeholder 2">
@@ -19792,8 +19795,8 @@
           </a:p>
         </p:txBody>
       </p:sp>
-      <mc:AlternateContent xmlns:mc="http://schemas.openxmlformats.org/markup-compatibility/2006">
-        <mc:Choice xmlns:a14="http://schemas.microsoft.com/office/drawing/2010/main" Requires="a14">
+      <mc:AlternateContent xmlns:mc="http://schemas.openxmlformats.org/markup-compatibility/2006" xmlns:a14="http://schemas.microsoft.com/office/drawing/2010/main">
+        <mc:Choice Requires="a14">
           <p:sp>
             <p:nvSpPr>
               <p:cNvPr id="3" name="Content Placeholder 2">
@@ -20296,7 +20299,7 @@
             </p:txBody>
           </p:sp>
         </mc:Choice>
-        <mc:Fallback>
+        <mc:Fallback xmlns="">
           <p:sp>
             <p:nvSpPr>
               <p:cNvPr id="3" name="Content Placeholder 2">

</xml_diff>